<commit_message>
working time on pptx
</commit_message>
<xml_diff>
--- a/iot_pres.pptx
+++ b/iot_pres.pptx
@@ -13137,7 +13137,7 @@
         </p:nvSpPr>
         <p:spPr>
           <a:xfrm>
-            <a:off x="4014216" y="5431536"/>
+            <a:off x="5239542" y="5500895"/>
             <a:ext cx="5121051" cy="369332"/>
           </a:xfrm>
           <a:prstGeom prst="rect">
@@ -13151,9 +13151,56 @@
           </a:bodyPr>
           <a:lstStyle/>
           <a:p>
+            <a:pPr marL="285750" indent="-285750">
+              <a:buClr>
+                <a:schemeClr val="accent6"/>
+              </a:buClr>
+              <a:buFont typeface="Wingdings" panose="05000000000000000000" pitchFamily="2" charset="2"/>
+              <a:buChar char="ü"/>
+            </a:pPr>
+            <a:r>
+              <a:rPr lang="it-IT" dirty="0" err="1"/>
+              <a:t>Both</a:t>
+            </a:r>
             <a:r>
               <a:rPr lang="it-IT" dirty="0"/>
-              <a:t>DFOPJGBDLFKBMNJODIFKIBN</a:t>
+              <a:t> </a:t>
+            </a:r>
+            <a:r>
+              <a:rPr lang="it-IT" dirty="0" err="1"/>
+              <a:t>have</a:t>
+            </a:r>
+            <a:r>
+              <a:rPr lang="it-IT" dirty="0"/>
+              <a:t> </a:t>
+            </a:r>
+            <a:r>
+              <a:rPr lang="it-IT" dirty="0" err="1"/>
+              <a:t>most</a:t>
+            </a:r>
+            <a:r>
+              <a:rPr lang="it-IT" dirty="0"/>
+              <a:t> of </a:t>
+            </a:r>
+            <a:r>
+              <a:rPr lang="it-IT" dirty="0" err="1"/>
+              <a:t>their</a:t>
+            </a:r>
+            <a:r>
+              <a:rPr lang="it-IT" dirty="0"/>
+              <a:t> work from </a:t>
+            </a:r>
+            <a:r>
+              <a:rPr lang="it-IT" b="1" dirty="0"/>
+              <a:t>8am</a:t>
+            </a:r>
+            <a:r>
+              <a:rPr lang="it-IT" dirty="0"/>
+              <a:t> to </a:t>
+            </a:r>
+            <a:r>
+              <a:rPr lang="it-IT" b="1" dirty="0"/>
+              <a:t>8pm</a:t>
             </a:r>
           </a:p>
         </p:txBody>

</xml_diff>

<commit_message>
cloud changes on README and pptx
</commit_message>
<xml_diff>
--- a/iot_pres.pptx
+++ b/iot_pres.pptx
@@ -15209,7 +15209,7 @@
         <p:spPr>
           <a:xfrm>
             <a:off x="4036291" y="1987262"/>
-            <a:ext cx="5754254" cy="4351338"/>
+            <a:ext cx="5754254" cy="3942198"/>
           </a:xfrm>
           <a:prstGeom prst="rect">
             <a:avLst/>
@@ -15347,7 +15347,25 @@
                 </a:solidFill>
                 <a:latin typeface="Aptos"/>
               </a:rPr>
-              <a:t> (led)</a:t>
+              <a:t> (</a:t>
+            </a:r>
+            <a:r>
+              <a:rPr lang="it-IT" sz="2800" b="0" strike="noStrike" spc="-1" dirty="0" err="1">
+                <a:solidFill>
+                  <a:srgbClr val="000000"/>
+                </a:solidFill>
+                <a:latin typeface="Aptos"/>
+              </a:rPr>
+              <a:t>leds</a:t>
+            </a:r>
+            <a:r>
+              <a:rPr lang="it-IT" sz="2800" b="0" strike="noStrike" spc="-1" dirty="0">
+                <a:solidFill>
+                  <a:srgbClr val="000000"/>
+                </a:solidFill>
+                <a:latin typeface="Aptos"/>
+              </a:rPr>
+              <a:t>)</a:t>
             </a:r>
           </a:p>
           <a:p>
@@ -15362,31 +15380,58 @@
               <a:buChar char="ü"/>
             </a:pPr>
             <a:r>
-              <a:rPr lang="it-IT" sz="2800" spc="-1" dirty="0" err="1">
+              <a:rPr lang="it-IT" sz="2800" strike="noStrike" spc="-1" dirty="0">
                 <a:solidFill>
                   <a:srgbClr val="000000"/>
                 </a:solidFill>
                 <a:latin typeface="Aptos"/>
               </a:rPr>
-              <a:t>Possible</a:t>
-            </a:r>
-            <a:r>
-              <a:rPr lang="it-IT" sz="2800" spc="-1" dirty="0">
+              <a:t>Information </a:t>
+            </a:r>
+            <a:r>
+              <a:rPr lang="it-IT" sz="2800" strike="noStrike" spc="-1" dirty="0" err="1">
                 <a:solidFill>
                   <a:srgbClr val="000000"/>
                 </a:solidFill>
                 <a:latin typeface="Aptos"/>
               </a:rPr>
-              <a:t> information from </a:t>
-            </a:r>
-            <a:r>
-              <a:rPr lang="it-IT" sz="2800" b="1" spc="-1" dirty="0">
+              <a:t>available</a:t>
+            </a:r>
+            <a:r>
+              <a:rPr lang="it-IT" sz="2800" strike="noStrike" spc="-1" dirty="0">
                 <a:solidFill>
                   <a:srgbClr val="000000"/>
                 </a:solidFill>
                 <a:latin typeface="Aptos"/>
               </a:rPr>
-              <a:t>cloud</a:t>
+              <a:t> on </a:t>
+            </a:r>
+            <a:r>
+              <a:rPr lang="it-IT" sz="2800" b="1" strike="noStrike" spc="-1" dirty="0">
+                <a:solidFill>
+                  <a:srgbClr val="000000"/>
+                </a:solidFill>
+                <a:latin typeface="Aptos"/>
+              </a:rPr>
+              <a:t>remote terminal</a:t>
+            </a:r>
+            <a:r>
+              <a:rPr lang="it-IT" sz="2800" strike="noStrike" spc="-1" dirty="0">
+                <a:solidFill>
+                  <a:srgbClr val="000000"/>
+                </a:solidFill>
+                <a:latin typeface="Aptos"/>
+              </a:rPr>
+              <a:t> </a:t>
+            </a:r>
+            <a:r>
+              <a:rPr lang="it-IT" sz="2800" strike="noStrike" spc="-1">
+                <a:solidFill>
+                  <a:srgbClr val="000000"/>
+                </a:solidFill>
+                <a:latin typeface="Aptos"/>
+              </a:rPr>
+              <a:t>(cloud)</a:t>
             </a:r>
             <a:endParaRPr lang="it-IT" sz="2800" b="1" strike="noStrike" spc="-1" dirty="0">
               <a:solidFill>

</xml_diff>